<commit_message>
Modification for Iteration 5
</commit_message>
<xml_diff>
--- a/Documents/Task 1/Task 1 Introduction to the MHC-PMS, First.pptx
+++ b/Documents/Task 1/Task 1 Introduction to the MHC-PMS, First.pptx
@@ -748,7 +748,7 @@
           <a:p>
             <a:fld id="{0A45DB2E-8C74-4E53-91FC-E562BF99EF76}" type="datetimeFigureOut">
               <a:rPr lang="de-CH" smtClean="0"/>
-              <a:t>25.09.2015</a:t>
+              <a:t>26.09.2015</a:t>
             </a:fld>
             <a:endParaRPr lang="de-CH"/>
           </a:p>
@@ -944,7 +944,7 @@
           <a:p>
             <a:fld id="{0A45DB2E-8C74-4E53-91FC-E562BF99EF76}" type="datetimeFigureOut">
               <a:rPr lang="de-CH" smtClean="0"/>
-              <a:t>25.09.2015</a:t>
+              <a:t>26.09.2015</a:t>
             </a:fld>
             <a:endParaRPr lang="de-CH"/>
           </a:p>
@@ -1129,7 +1129,7 @@
           <a:p>
             <a:fld id="{0A45DB2E-8C74-4E53-91FC-E562BF99EF76}" type="datetimeFigureOut">
               <a:rPr lang="de-CH" smtClean="0"/>
-              <a:t>25.09.2015</a:t>
+              <a:t>26.09.2015</a:t>
             </a:fld>
             <a:endParaRPr lang="de-CH"/>
           </a:p>
@@ -1279,7 +1279,7 @@
           <a:p>
             <a:fld id="{0A45DB2E-8C74-4E53-91FC-E562BF99EF76}" type="datetimeFigureOut">
               <a:rPr lang="de-CH" smtClean="0"/>
-              <a:t>25.09.2015</a:t>
+              <a:t>26.09.2015</a:t>
             </a:fld>
             <a:endParaRPr lang="de-CH"/>
           </a:p>
@@ -1534,7 +1534,7 @@
           <a:p>
             <a:fld id="{0A45DB2E-8C74-4E53-91FC-E562BF99EF76}" type="datetimeFigureOut">
               <a:rPr lang="de-CH" smtClean="0"/>
-              <a:t>25.09.2015</a:t>
+              <a:t>26.09.2015</a:t>
             </a:fld>
             <a:endParaRPr lang="de-CH"/>
           </a:p>
@@ -1943,7 +1943,7 @@
           <a:p>
             <a:fld id="{0A45DB2E-8C74-4E53-91FC-E562BF99EF76}" type="datetimeFigureOut">
               <a:rPr lang="de-CH" smtClean="0"/>
-              <a:t>25.09.2015</a:t>
+              <a:t>26.09.2015</a:t>
             </a:fld>
             <a:endParaRPr lang="de-CH"/>
           </a:p>
@@ -2389,7 +2389,7 @@
           <a:p>
             <a:fld id="{0A45DB2E-8C74-4E53-91FC-E562BF99EF76}" type="datetimeFigureOut">
               <a:rPr lang="de-CH" smtClean="0"/>
-              <a:t>25.09.2015</a:t>
+              <a:t>26.09.2015</a:t>
             </a:fld>
             <a:endParaRPr lang="de-CH"/>
           </a:p>
@@ -2490,7 +2490,7 @@
           <a:p>
             <a:fld id="{0A45DB2E-8C74-4E53-91FC-E562BF99EF76}" type="datetimeFigureOut">
               <a:rPr lang="de-CH" smtClean="0"/>
-              <a:t>25.09.2015</a:t>
+              <a:t>26.09.2015</a:t>
             </a:fld>
             <a:endParaRPr lang="de-CH"/>
           </a:p>
@@ -2611,7 +2611,7 @@
           <a:p>
             <a:fld id="{0A45DB2E-8C74-4E53-91FC-E562BF99EF76}" type="datetimeFigureOut">
               <a:rPr lang="de-CH" smtClean="0"/>
-              <a:t>25.09.2015</a:t>
+              <a:t>26.09.2015</a:t>
             </a:fld>
             <a:endParaRPr lang="de-CH"/>
           </a:p>
@@ -2885,7 +2885,7 @@
           <a:p>
             <a:fld id="{0A45DB2E-8C74-4E53-91FC-E562BF99EF76}" type="datetimeFigureOut">
               <a:rPr lang="de-CH" smtClean="0"/>
-              <a:t>25.09.2015</a:t>
+              <a:t>26.09.2015</a:t>
             </a:fld>
             <a:endParaRPr lang="de-CH"/>
           </a:p>
@@ -3090,7 +3090,7 @@
           <a:p>
             <a:fld id="{0A45DB2E-8C74-4E53-91FC-E562BF99EF76}" type="datetimeFigureOut">
               <a:rPr lang="de-CH" smtClean="0"/>
-              <a:t>25.09.2015</a:t>
+              <a:t>26.09.2015</a:t>
             </a:fld>
             <a:endParaRPr lang="de-CH"/>
           </a:p>
@@ -4199,7 +4199,7 @@
           <a:p>
             <a:fld id="{0A45DB2E-8C74-4E53-91FC-E562BF99EF76}" type="datetimeFigureOut">
               <a:rPr lang="de-CH" smtClean="0"/>
-              <a:t>25.09.2015</a:t>
+              <a:t>26.09.2015</a:t>
             </a:fld>
             <a:endParaRPr lang="de-CH"/>
           </a:p>
@@ -4747,8 +4747,13 @@
           <a:p>
             <a:r>
               <a:rPr lang="de-CH" dirty="0" smtClean="0"/>
-              <a:t>6 Iterationen</a:t>
-            </a:r>
+              <a:t>6 </a:t>
+            </a:r>
+            <a:r>
+              <a:rPr lang="de-CH" dirty="0" smtClean="0"/>
+              <a:t>Iterationen mit 2 Wochen Länge</a:t>
+            </a:r>
+            <a:endParaRPr lang="de-CH" dirty="0" smtClean="0"/>
           </a:p>
           <a:p>
             <a:endParaRPr lang="de-CH" dirty="0"/>
@@ -5314,29 +5319,54 @@
             </a:r>
           </a:p>
           <a:p>
+            <a:pPr lvl="1"/>
+            <a:r>
+              <a:rPr lang="de-CH" dirty="0" smtClean="0"/>
+              <a:t>Verschiedene Datenauswertungen</a:t>
+            </a:r>
+            <a:endParaRPr lang="de-CH" dirty="0" smtClean="0"/>
+          </a:p>
+          <a:p>
             <a:r>
               <a:rPr lang="de-CH" dirty="0" smtClean="0"/>
               <a:t>Ziel</a:t>
             </a:r>
           </a:p>
           <a:p>
+            <a:pPr lvl="1"/>
+            <a:r>
+              <a:rPr lang="de-CH" dirty="0" smtClean="0"/>
+              <a:t>Die benötigten Datenauswertungen sind evaluiert und implementiert</a:t>
+            </a:r>
+            <a:endParaRPr lang="de-CH" dirty="0" smtClean="0"/>
+          </a:p>
+          <a:p>
             <a:r>
               <a:rPr lang="de-CH" dirty="0" smtClean="0"/>
               <a:t>Aufgaben</a:t>
             </a:r>
           </a:p>
           <a:p>
+            <a:pPr lvl="1"/>
+            <a:r>
+              <a:rPr lang="de-CH" dirty="0" smtClean="0"/>
+              <a:t>Datenauswertungen definieren, umsetzen</a:t>
+            </a:r>
+            <a:endParaRPr lang="de-CH" dirty="0" smtClean="0"/>
+          </a:p>
+          <a:p>
             <a:r>
               <a:rPr lang="de-CH" dirty="0" smtClean="0"/>
               <a:t>Ergebnisse</a:t>
             </a:r>
           </a:p>
           <a:p>
-            <a:r>
-              <a:rPr lang="de-CH" dirty="0" smtClean="0"/>
-              <a:t>Marwin</a:t>
-            </a:r>
-            <a:endParaRPr lang="de-CH" dirty="0"/>
+            <a:pPr lvl="1"/>
+            <a:r>
+              <a:rPr lang="de-CH" dirty="0" smtClean="0"/>
+              <a:t>Konfigurierbares Auswertungsframework mit implementierten Datenauswertungen</a:t>
+            </a:r>
+            <a:endParaRPr lang="de-CH" dirty="0" smtClean="0"/>
           </a:p>
         </p:txBody>
       </p:sp>
@@ -6098,7 +6128,7 @@
           <p:nvPr>
             <p:extLst>
               <p:ext uri="{D42A27DB-BD31-4B8C-83A1-F6EECF244321}">
-                <p14:modId xmlns:p14="http://schemas.microsoft.com/office/powerpoint/2010/main" val="2569207257"/>
+                <p14:modId xmlns:p14="http://schemas.microsoft.com/office/powerpoint/2010/main" val="3897188120"/>
               </p:ext>
             </p:extLst>
           </p:nvPr>
@@ -6155,11 +6185,7 @@
                     <a:p>
                       <a:r>
                         <a:rPr lang="de-CH" dirty="0" smtClean="0"/>
-                        <a:t>Detaillierte la</a:t>
-                      </a:r>
-                      <a:r>
-                        <a:rPr lang="de-CH" dirty="0" smtClean="0"/>
-                        <a:t>ngfristige</a:t>
+                        <a:t>Detaillierte langfristige</a:t>
                       </a:r>
                       <a:r>
                         <a:rPr lang="de-CH" baseline="0" dirty="0" smtClean="0"/>
@@ -6239,10 +6265,6 @@
                     <a:bodyPr/>
                     <a:lstStyle/>
                     <a:p>
-                      <a:r>
-                        <a:rPr lang="de-CH" dirty="0" smtClean="0"/>
-                        <a:t>Nicht Agil</a:t>
-                      </a:r>
                       <a:endParaRPr lang="de-CH" dirty="0"/>
                     </a:p>
                   </a:txBody>

</xml_diff>

<commit_message>
TODO: Turna, pp ergänzt.
</commit_message>
<xml_diff>
--- a/Documents/Task 1/Task 1 Introduction to the MHC-PMS, First.pptx
+++ b/Documents/Task 1/Task 1 Introduction to the MHC-PMS, First.pptx
@@ -120,6 +120,22 @@
       </a:defRPr>
     </a:lvl9pPr>
   </p:defaultTextStyle>
+  <p:extLst>
+    <p:ext uri="{EFAFB233-063F-42B5-8137-9DF3F51BA10A}">
+      <p15:sldGuideLst xmlns:p15="http://schemas.microsoft.com/office/powerpoint/2012/main">
+        <p15:guide id="1" orient="horz" pos="2160">
+          <p15:clr>
+            <a:srgbClr val="A4A3A4"/>
+          </p15:clr>
+        </p15:guide>
+        <p15:guide id="2" pos="2880">
+          <p15:clr>
+            <a:srgbClr val="A4A3A4"/>
+          </p15:clr>
+        </p15:guide>
+      </p15:sldGuideLst>
+    </p:ext>
+  </p:extLst>
 </p:presentation>
 </file>
 
@@ -748,7 +764,7 @@
           <a:p>
             <a:fld id="{0A45DB2E-8C74-4E53-91FC-E562BF99EF76}" type="datetimeFigureOut">
               <a:rPr lang="de-CH" smtClean="0"/>
-              <a:t>26.09.2015</a:t>
+              <a:t>28.09.2015</a:t>
             </a:fld>
             <a:endParaRPr lang="de-CH"/>
           </a:p>
@@ -944,7 +960,7 @@
           <a:p>
             <a:fld id="{0A45DB2E-8C74-4E53-91FC-E562BF99EF76}" type="datetimeFigureOut">
               <a:rPr lang="de-CH" smtClean="0"/>
-              <a:t>26.09.2015</a:t>
+              <a:t>28.09.2015</a:t>
             </a:fld>
             <a:endParaRPr lang="de-CH"/>
           </a:p>
@@ -1129,7 +1145,7 @@
           <a:p>
             <a:fld id="{0A45DB2E-8C74-4E53-91FC-E562BF99EF76}" type="datetimeFigureOut">
               <a:rPr lang="de-CH" smtClean="0"/>
-              <a:t>26.09.2015</a:t>
+              <a:t>28.09.2015</a:t>
             </a:fld>
             <a:endParaRPr lang="de-CH"/>
           </a:p>
@@ -1279,7 +1295,7 @@
           <a:p>
             <a:fld id="{0A45DB2E-8C74-4E53-91FC-E562BF99EF76}" type="datetimeFigureOut">
               <a:rPr lang="de-CH" smtClean="0"/>
-              <a:t>26.09.2015</a:t>
+              <a:t>28.09.2015</a:t>
             </a:fld>
             <a:endParaRPr lang="de-CH"/>
           </a:p>
@@ -1534,7 +1550,7 @@
           <a:p>
             <a:fld id="{0A45DB2E-8C74-4E53-91FC-E562BF99EF76}" type="datetimeFigureOut">
               <a:rPr lang="de-CH" smtClean="0"/>
-              <a:t>26.09.2015</a:t>
+              <a:t>28.09.2015</a:t>
             </a:fld>
             <a:endParaRPr lang="de-CH"/>
           </a:p>
@@ -1943,7 +1959,7 @@
           <a:p>
             <a:fld id="{0A45DB2E-8C74-4E53-91FC-E562BF99EF76}" type="datetimeFigureOut">
               <a:rPr lang="de-CH" smtClean="0"/>
-              <a:t>26.09.2015</a:t>
+              <a:t>28.09.2015</a:t>
             </a:fld>
             <a:endParaRPr lang="de-CH"/>
           </a:p>
@@ -2389,7 +2405,7 @@
           <a:p>
             <a:fld id="{0A45DB2E-8C74-4E53-91FC-E562BF99EF76}" type="datetimeFigureOut">
               <a:rPr lang="de-CH" smtClean="0"/>
-              <a:t>26.09.2015</a:t>
+              <a:t>28.09.2015</a:t>
             </a:fld>
             <a:endParaRPr lang="de-CH"/>
           </a:p>
@@ -2490,7 +2506,7 @@
           <a:p>
             <a:fld id="{0A45DB2E-8C74-4E53-91FC-E562BF99EF76}" type="datetimeFigureOut">
               <a:rPr lang="de-CH" smtClean="0"/>
-              <a:t>26.09.2015</a:t>
+              <a:t>28.09.2015</a:t>
             </a:fld>
             <a:endParaRPr lang="de-CH"/>
           </a:p>
@@ -2611,7 +2627,7 @@
           <a:p>
             <a:fld id="{0A45DB2E-8C74-4E53-91FC-E562BF99EF76}" type="datetimeFigureOut">
               <a:rPr lang="de-CH" smtClean="0"/>
-              <a:t>26.09.2015</a:t>
+              <a:t>28.09.2015</a:t>
             </a:fld>
             <a:endParaRPr lang="de-CH"/>
           </a:p>
@@ -2885,7 +2901,7 @@
           <a:p>
             <a:fld id="{0A45DB2E-8C74-4E53-91FC-E562BF99EF76}" type="datetimeFigureOut">
               <a:rPr lang="de-CH" smtClean="0"/>
-              <a:t>26.09.2015</a:t>
+              <a:t>28.09.2015</a:t>
             </a:fld>
             <a:endParaRPr lang="de-CH"/>
           </a:p>
@@ -3090,7 +3106,7 @@
           <a:p>
             <a:fld id="{0A45DB2E-8C74-4E53-91FC-E562BF99EF76}" type="datetimeFigureOut">
               <a:rPr lang="de-CH" smtClean="0"/>
-              <a:t>26.09.2015</a:t>
+              <a:t>28.09.2015</a:t>
             </a:fld>
             <a:endParaRPr lang="de-CH"/>
           </a:p>
@@ -4199,7 +4215,7 @@
           <a:p>
             <a:fld id="{0A45DB2E-8C74-4E53-91FC-E562BF99EF76}" type="datetimeFigureOut">
               <a:rPr lang="de-CH" smtClean="0"/>
-              <a:t>26.09.2015</a:t>
+              <a:t>28.09.2015</a:t>
             </a:fld>
             <a:endParaRPr lang="de-CH"/>
           </a:p>
@@ -4747,13 +4763,8 @@
           <a:p>
             <a:r>
               <a:rPr lang="de-CH" dirty="0" smtClean="0"/>
-              <a:t>6 </a:t>
-            </a:r>
-            <a:r>
-              <a:rPr lang="de-CH" dirty="0" smtClean="0"/>
-              <a:t>Iterationen mit 2 Wochen Länge</a:t>
-            </a:r>
-            <a:endParaRPr lang="de-CH" dirty="0" smtClean="0"/>
+              <a:t>6 Iterationen mit 2 Wochen Länge</a:t>
+            </a:r>
           </a:p>
           <a:p>
             <a:endParaRPr lang="de-CH" dirty="0"/>
@@ -5201,7 +5212,9 @@
         </p:nvSpPr>
         <p:spPr/>
         <p:txBody>
-          <a:bodyPr/>
+          <a:bodyPr>
+            <a:normAutofit lnSpcReduction="10000"/>
+          </a:bodyPr>
           <a:lstStyle/>
           <a:p>
             <a:r>
@@ -5210,27 +5223,86 @@
             </a:r>
           </a:p>
           <a:p>
+            <a:pPr lvl="1"/>
+            <a:r>
+              <a:rPr lang="de-CH" dirty="0" smtClean="0"/>
+              <a:t>Psych. </a:t>
+            </a:r>
+            <a:r>
+              <a:rPr lang="de-CH" dirty="0" err="1" smtClean="0"/>
+              <a:t>Verlaufsdok</a:t>
+            </a:r>
+            <a:r>
+              <a:rPr lang="de-CH" dirty="0" smtClean="0"/>
+              <a:t>. führen, Zugriffsmöglichkeiten, Arbeitsunterlage bereitstellen </a:t>
+            </a:r>
+          </a:p>
+          <a:p>
             <a:r>
               <a:rPr lang="de-CH" dirty="0" smtClean="0"/>
               <a:t>Ziel</a:t>
             </a:r>
           </a:p>
           <a:p>
+            <a:pPr lvl="1"/>
+            <a:r>
+              <a:rPr lang="de-CH" dirty="0" smtClean="0"/>
+              <a:t>Verdeutlichung der zeitlichen Veränderungen</a:t>
+            </a:r>
+          </a:p>
+          <a:p>
+            <a:pPr lvl="1"/>
+            <a:r>
+              <a:rPr lang="de-CH" dirty="0" smtClean="0"/>
+              <a:t>Entwicklung der Erkrankung + Massnahmen</a:t>
+            </a:r>
+            <a:endParaRPr lang="de-CH" dirty="0" smtClean="0"/>
+          </a:p>
+          <a:p>
             <a:r>
               <a:rPr lang="de-CH" dirty="0" smtClean="0"/>
               <a:t>Aufgaben</a:t>
             </a:r>
           </a:p>
           <a:p>
+            <a:pPr lvl="1"/>
+            <a:r>
+              <a:rPr lang="de-CH" dirty="0" smtClean="0"/>
+              <a:t>Patient im Zeitverlauf abbilden, Rechtevergabe, </a:t>
+            </a:r>
+            <a:r>
+              <a:rPr lang="de-CH" dirty="0" smtClean="0"/>
+              <a:t>Therapiestandards</a:t>
+            </a:r>
+            <a:endParaRPr lang="de-CH" dirty="0" smtClean="0"/>
+          </a:p>
+          <a:p>
             <a:r>
               <a:rPr lang="de-CH" dirty="0" smtClean="0"/>
               <a:t>Ergebnisse</a:t>
             </a:r>
           </a:p>
           <a:p>
-            <a:r>
-              <a:rPr lang="de-CH" dirty="0" smtClean="0"/>
-              <a:t>Mete</a:t>
+            <a:pPr lvl="1"/>
+            <a:r>
+              <a:rPr lang="de-CH" dirty="0" smtClean="0"/>
+              <a:t>klinische </a:t>
+            </a:r>
+            <a:r>
+              <a:rPr lang="de-CH" dirty="0"/>
+              <a:t>Arbeit </a:t>
+            </a:r>
+            <a:r>
+              <a:rPr lang="de-CH" dirty="0" smtClean="0"/>
+              <a:t>unterstützen durch </a:t>
+            </a:r>
+            <a:r>
+              <a:rPr lang="de-CH" dirty="0"/>
+              <a:t>Visualisierung des </a:t>
+            </a:r>
+            <a:r>
+              <a:rPr lang="de-CH" dirty="0" smtClean="0"/>
+              <a:t>Behandlungsprozesse, Datensicherheit</a:t>
             </a:r>
             <a:endParaRPr lang="de-CH" dirty="0"/>
           </a:p>
@@ -5324,7 +5396,6 @@
               <a:rPr lang="de-CH" dirty="0" smtClean="0"/>
               <a:t>Verschiedene Datenauswertungen</a:t>
             </a:r>
-            <a:endParaRPr lang="de-CH" dirty="0" smtClean="0"/>
           </a:p>
           <a:p>
             <a:r>
@@ -5338,7 +5409,6 @@
               <a:rPr lang="de-CH" dirty="0" smtClean="0"/>
               <a:t>Die benötigten Datenauswertungen sind evaluiert und implementiert</a:t>
             </a:r>
-            <a:endParaRPr lang="de-CH" dirty="0" smtClean="0"/>
           </a:p>
           <a:p>
             <a:r>
@@ -5352,7 +5422,6 @@
               <a:rPr lang="de-CH" dirty="0" smtClean="0"/>
               <a:t>Datenauswertungen definieren, umsetzen</a:t>
             </a:r>
-            <a:endParaRPr lang="de-CH" dirty="0" smtClean="0"/>
           </a:p>
           <a:p>
             <a:r>
@@ -5366,7 +5435,6 @@
               <a:rPr lang="de-CH" dirty="0" smtClean="0"/>
               <a:t>Konfigurierbares Auswertungsframework mit implementierten Datenauswertungen</a:t>
             </a:r>
-            <a:endParaRPr lang="de-CH" dirty="0" smtClean="0"/>
           </a:p>
         </p:txBody>
       </p:sp>
@@ -6820,25 +6888,6 @@
           <a:chExt cx="0" cy="0"/>
         </a:xfrm>
       </p:grpSpPr>
-      <p:sp>
-        <p:nvSpPr>
-          <p:cNvPr id="2" name="Inhaltsplatzhalter 1"/>
-          <p:cNvSpPr>
-            <a:spLocks noGrp="1"/>
-          </p:cNvSpPr>
-          <p:nvPr>
-            <p:ph idx="1"/>
-          </p:nvPr>
-        </p:nvSpPr>
-        <p:spPr/>
-        <p:txBody>
-          <a:bodyPr/>
-          <a:lstStyle/>
-          <a:p>
-            <a:endParaRPr lang="de-CH"/>
-          </a:p>
-        </p:txBody>
-      </p:sp>
       <p:sp>
         <p:nvSpPr>
           <p:cNvPr id="3" name="Titel 2"/>

</xml_diff>

<commit_message>
Modification for Iteration 2 "Terminplanung" Added ToDo from Murbach
</commit_message>
<xml_diff>
--- a/Documents/Task 1/Task 1 Introduction to the MHC-PMS, First.pptx
+++ b/Documents/Task 1/Task 1 Introduction to the MHC-PMS, First.pptx
@@ -1,6 +1,6 @@
 
 <file path=ppt/presentation.xml><?xml version="1.0" encoding="utf-8"?>
-<p:presentation xmlns:a="http://schemas.openxmlformats.org/drawingml/2006/main" xmlns:r="http://schemas.openxmlformats.org/officeDocument/2006/relationships" xmlns:p="http://schemas.openxmlformats.org/presentationml/2006/main" saveSubsetFonts="1">
+<p:presentation xmlns:a="http://schemas.openxmlformats.org/drawingml/2006/main" xmlns:r="http://schemas.openxmlformats.org/officeDocument/2006/relationships" xmlns:p="http://schemas.openxmlformats.org/presentationml/2006/main" serverZoom="30563" saveSubsetFonts="1">
   <p:sldMasterIdLst>
     <p:sldMasterId id="2147483660" r:id="rId1"/>
   </p:sldMasterIdLst>
@@ -764,7 +764,7 @@
           <a:p>
             <a:fld id="{0A45DB2E-8C74-4E53-91FC-E562BF99EF76}" type="datetimeFigureOut">
               <a:rPr lang="de-CH" smtClean="0"/>
-              <a:t>28.09.2015</a:t>
+              <a:t>29.09.2015</a:t>
             </a:fld>
             <a:endParaRPr lang="de-CH"/>
           </a:p>
@@ -960,7 +960,7 @@
           <a:p>
             <a:fld id="{0A45DB2E-8C74-4E53-91FC-E562BF99EF76}" type="datetimeFigureOut">
               <a:rPr lang="de-CH" smtClean="0"/>
-              <a:t>28.09.2015</a:t>
+              <a:t>29.09.2015</a:t>
             </a:fld>
             <a:endParaRPr lang="de-CH"/>
           </a:p>
@@ -1145,7 +1145,7 @@
           <a:p>
             <a:fld id="{0A45DB2E-8C74-4E53-91FC-E562BF99EF76}" type="datetimeFigureOut">
               <a:rPr lang="de-CH" smtClean="0"/>
-              <a:t>28.09.2015</a:t>
+              <a:t>29.09.2015</a:t>
             </a:fld>
             <a:endParaRPr lang="de-CH"/>
           </a:p>
@@ -1295,7 +1295,7 @@
           <a:p>
             <a:fld id="{0A45DB2E-8C74-4E53-91FC-E562BF99EF76}" type="datetimeFigureOut">
               <a:rPr lang="de-CH" smtClean="0"/>
-              <a:t>28.09.2015</a:t>
+              <a:t>29.09.2015</a:t>
             </a:fld>
             <a:endParaRPr lang="de-CH"/>
           </a:p>
@@ -1550,7 +1550,7 @@
           <a:p>
             <a:fld id="{0A45DB2E-8C74-4E53-91FC-E562BF99EF76}" type="datetimeFigureOut">
               <a:rPr lang="de-CH" smtClean="0"/>
-              <a:t>28.09.2015</a:t>
+              <a:t>29.09.2015</a:t>
             </a:fld>
             <a:endParaRPr lang="de-CH"/>
           </a:p>
@@ -1959,7 +1959,7 @@
           <a:p>
             <a:fld id="{0A45DB2E-8C74-4E53-91FC-E562BF99EF76}" type="datetimeFigureOut">
               <a:rPr lang="de-CH" smtClean="0"/>
-              <a:t>28.09.2015</a:t>
+              <a:t>29.09.2015</a:t>
             </a:fld>
             <a:endParaRPr lang="de-CH"/>
           </a:p>
@@ -2405,7 +2405,7 @@
           <a:p>
             <a:fld id="{0A45DB2E-8C74-4E53-91FC-E562BF99EF76}" type="datetimeFigureOut">
               <a:rPr lang="de-CH" smtClean="0"/>
-              <a:t>28.09.2015</a:t>
+              <a:t>29.09.2015</a:t>
             </a:fld>
             <a:endParaRPr lang="de-CH"/>
           </a:p>
@@ -2506,7 +2506,7 @@
           <a:p>
             <a:fld id="{0A45DB2E-8C74-4E53-91FC-E562BF99EF76}" type="datetimeFigureOut">
               <a:rPr lang="de-CH" smtClean="0"/>
-              <a:t>28.09.2015</a:t>
+              <a:t>29.09.2015</a:t>
             </a:fld>
             <a:endParaRPr lang="de-CH"/>
           </a:p>
@@ -2627,7 +2627,7 @@
           <a:p>
             <a:fld id="{0A45DB2E-8C74-4E53-91FC-E562BF99EF76}" type="datetimeFigureOut">
               <a:rPr lang="de-CH" smtClean="0"/>
-              <a:t>28.09.2015</a:t>
+              <a:t>29.09.2015</a:t>
             </a:fld>
             <a:endParaRPr lang="de-CH"/>
           </a:p>
@@ -2901,7 +2901,7 @@
           <a:p>
             <a:fld id="{0A45DB2E-8C74-4E53-91FC-E562BF99EF76}" type="datetimeFigureOut">
               <a:rPr lang="de-CH" smtClean="0"/>
-              <a:t>28.09.2015</a:t>
+              <a:t>29.09.2015</a:t>
             </a:fld>
             <a:endParaRPr lang="de-CH"/>
           </a:p>
@@ -3106,7 +3106,7 @@
           <a:p>
             <a:fld id="{0A45DB2E-8C74-4E53-91FC-E562BF99EF76}" type="datetimeFigureOut">
               <a:rPr lang="de-CH" smtClean="0"/>
-              <a:t>28.09.2015</a:t>
+              <a:t>29.09.2015</a:t>
             </a:fld>
             <a:endParaRPr lang="de-CH"/>
           </a:p>
@@ -4215,7 +4215,7 @@
           <a:p>
             <a:fld id="{0A45DB2E-8C74-4E53-91FC-E562BF99EF76}" type="datetimeFigureOut">
               <a:rPr lang="de-CH" smtClean="0"/>
-              <a:t>28.09.2015</a:t>
+              <a:t>29.09.2015</a:t>
             </a:fld>
             <a:endParaRPr lang="de-CH"/>
           </a:p>
@@ -4996,8 +4996,8 @@
           <a:p>
             <a:pPr lvl="1"/>
             <a:r>
-              <a:rPr lang="de-CH" dirty="0" err="1" smtClean="0"/>
-              <a:t>Terminlanung</a:t>
+              <a:rPr lang="de-CH" dirty="0" smtClean="0"/>
+              <a:t>Terminplanung</a:t>
             </a:r>
             <a:endParaRPr lang="de-CH" dirty="0" smtClean="0"/>
           </a:p>
@@ -5011,8 +5011,13 @@
             <a:pPr lvl="1"/>
             <a:r>
               <a:rPr lang="de-CH" dirty="0" smtClean="0"/>
-              <a:t>Terminplanung ist implementiert</a:t>
-            </a:r>
+              <a:t>Terminplanung ist </a:t>
+            </a:r>
+            <a:r>
+              <a:rPr lang="de-CH" dirty="0" smtClean="0"/>
+              <a:t>implementiert</a:t>
+            </a:r>
+            <a:endParaRPr lang="de-CH" dirty="0" smtClean="0"/>
           </a:p>
           <a:p>
             <a:r>
@@ -5021,17 +5026,27 @@
             </a:r>
           </a:p>
           <a:p>
+            <a:pPr lvl="1"/>
+            <a:r>
+              <a:rPr lang="de-CH" dirty="0" smtClean="0"/>
+              <a:t>Funktionalitäten der Terminplanung definieren und umsetzen</a:t>
+            </a:r>
+            <a:endParaRPr lang="de-CH" dirty="0" smtClean="0"/>
+          </a:p>
+          <a:p>
             <a:r>
               <a:rPr lang="de-CH" dirty="0" smtClean="0"/>
               <a:t>Ergebnisse</a:t>
             </a:r>
-          </a:p>
-          <a:p>
-            <a:r>
-              <a:rPr lang="de-CH" dirty="0" smtClean="0"/>
-              <a:t>Jonas</a:t>
-            </a:r>
             <a:endParaRPr lang="de-CH" dirty="0"/>
+          </a:p>
+          <a:p>
+            <a:pPr lvl="1"/>
+            <a:r>
+              <a:rPr lang="de-CH" dirty="0" smtClean="0"/>
+              <a:t>Implementierte Terminplanung mit Funktionen wie Drop-In und mehrere Standorte</a:t>
+            </a:r>
+            <a:endParaRPr lang="de-CH" dirty="0" smtClean="0"/>
           </a:p>
         </p:txBody>
       </p:sp>
@@ -5256,7 +5271,6 @@
               <a:rPr lang="de-CH" dirty="0" smtClean="0"/>
               <a:t>Entwicklung der Erkrankung + Massnahmen</a:t>
             </a:r>
-            <a:endParaRPr lang="de-CH" dirty="0" smtClean="0"/>
           </a:p>
           <a:p>
             <a:r>
@@ -5268,13 +5282,8 @@
             <a:pPr lvl="1"/>
             <a:r>
               <a:rPr lang="de-CH" dirty="0" smtClean="0"/>
-              <a:t>Patient im Zeitverlauf abbilden, Rechtevergabe, </a:t>
-            </a:r>
-            <a:r>
-              <a:rPr lang="de-CH" dirty="0" smtClean="0"/>
-              <a:t>Therapiestandards</a:t>
-            </a:r>
-            <a:endParaRPr lang="de-CH" dirty="0" smtClean="0"/>
+              <a:t>Patient im Zeitverlauf abbilden, Rechtevergabe, Therapiestandards</a:t>
+            </a:r>
           </a:p>
           <a:p>
             <a:r>

</xml_diff>

<commit_message>
Modification for Iteration 3 "Medizinisches Verordnungswesen"
</commit_message>
<xml_diff>
--- a/Documents/Task 1/Task 1 Introduction to the MHC-PMS, First.pptx
+++ b/Documents/Task 1/Task 1 Introduction to the MHC-PMS, First.pptx
@@ -1,6 +1,6 @@
 
 <file path=ppt/presentation.xml><?xml version="1.0" encoding="utf-8"?>
-<p:presentation xmlns:a="http://schemas.openxmlformats.org/drawingml/2006/main" xmlns:r="http://schemas.openxmlformats.org/officeDocument/2006/relationships" xmlns:p="http://schemas.openxmlformats.org/presentationml/2006/main" serverZoom="30563" saveSubsetFonts="1">
+<p:presentation xmlns:a="http://schemas.openxmlformats.org/drawingml/2006/main" xmlns:r="http://schemas.openxmlformats.org/officeDocument/2006/relationships" xmlns:p="http://schemas.openxmlformats.org/presentationml/2006/main" serverZoom="15290" saveSubsetFonts="1">
   <p:sldMasterIdLst>
     <p:sldMasterId id="2147483660" r:id="rId1"/>
   </p:sldMasterIdLst>
@@ -122,7 +122,7 @@
   </p:defaultTextStyle>
   <p:extLst>
     <p:ext uri="{EFAFB233-063F-42B5-8137-9DF3F51BA10A}">
-      <p15:sldGuideLst xmlns:p15="http://schemas.microsoft.com/office/powerpoint/2012/main">
+      <p15:sldGuideLst xmlns:p15="http://schemas.microsoft.com/office/powerpoint/2012/main" xmlns="">
         <p15:guide id="1" orient="horz" pos="2160">
           <p15:clr>
             <a:srgbClr val="A4A3A4"/>
@@ -826,7 +826,7 @@
           <a:p>
             <a:fld id="{E9D2D021-4DB1-4DE2-A389-81DEDCED8613}" type="slidenum">
               <a:rPr lang="de-CH" smtClean="0"/>
-              <a:t>‹Nr.›</a:t>
+              <a:t>‹#›</a:t>
             </a:fld>
             <a:endParaRPr lang="de-CH"/>
           </a:p>
@@ -1006,7 +1006,7 @@
           <a:p>
             <a:fld id="{E9D2D021-4DB1-4DE2-A389-81DEDCED8613}" type="slidenum">
               <a:rPr lang="de-CH" smtClean="0"/>
-              <a:t>‹Nr.›</a:t>
+              <a:t>‹#›</a:t>
             </a:fld>
             <a:endParaRPr lang="de-CH"/>
           </a:p>
@@ -1191,7 +1191,7 @@
           <a:p>
             <a:fld id="{E9D2D021-4DB1-4DE2-A389-81DEDCED8613}" type="slidenum">
               <a:rPr lang="de-CH" smtClean="0"/>
-              <a:t>‹Nr.›</a:t>
+              <a:t>‹#›</a:t>
             </a:fld>
             <a:endParaRPr lang="de-CH"/>
           </a:p>
@@ -1341,7 +1341,7 @@
           <a:p>
             <a:fld id="{E9D2D021-4DB1-4DE2-A389-81DEDCED8613}" type="slidenum">
               <a:rPr lang="de-CH" smtClean="0"/>
-              <a:t>‹Nr.›</a:t>
+              <a:t>‹#›</a:t>
             </a:fld>
             <a:endParaRPr lang="de-CH"/>
           </a:p>
@@ -1596,7 +1596,7 @@
           <a:p>
             <a:fld id="{E9D2D021-4DB1-4DE2-A389-81DEDCED8613}" type="slidenum">
               <a:rPr lang="de-CH" smtClean="0"/>
-              <a:t>‹Nr.›</a:t>
+              <a:t>‹#›</a:t>
             </a:fld>
             <a:endParaRPr lang="de-CH"/>
           </a:p>
@@ -2005,7 +2005,7 @@
           <a:p>
             <a:fld id="{E9D2D021-4DB1-4DE2-A389-81DEDCED8613}" type="slidenum">
               <a:rPr lang="de-CH" smtClean="0"/>
-              <a:t>‹Nr.›</a:t>
+              <a:t>‹#›</a:t>
             </a:fld>
             <a:endParaRPr lang="de-CH"/>
           </a:p>
@@ -2451,7 +2451,7 @@
           <a:p>
             <a:fld id="{E9D2D021-4DB1-4DE2-A389-81DEDCED8613}" type="slidenum">
               <a:rPr lang="de-CH" smtClean="0"/>
-              <a:t>‹Nr.›</a:t>
+              <a:t>‹#›</a:t>
             </a:fld>
             <a:endParaRPr lang="de-CH"/>
           </a:p>
@@ -2552,7 +2552,7 @@
           <a:p>
             <a:fld id="{E9D2D021-4DB1-4DE2-A389-81DEDCED8613}" type="slidenum">
               <a:rPr lang="de-CH" smtClean="0"/>
-              <a:t>‹Nr.›</a:t>
+              <a:t>‹#›</a:t>
             </a:fld>
             <a:endParaRPr lang="de-CH"/>
           </a:p>
@@ -2673,7 +2673,7 @@
           <a:p>
             <a:fld id="{E9D2D021-4DB1-4DE2-A389-81DEDCED8613}" type="slidenum">
               <a:rPr lang="de-CH" smtClean="0"/>
-              <a:t>‹Nr.›</a:t>
+              <a:t>‹#›</a:t>
             </a:fld>
             <a:endParaRPr lang="de-CH"/>
           </a:p>
@@ -2947,7 +2947,7 @@
           <a:p>
             <a:fld id="{E9D2D021-4DB1-4DE2-A389-81DEDCED8613}" type="slidenum">
               <a:rPr lang="de-CH" smtClean="0"/>
-              <a:t>‹Nr.›</a:t>
+              <a:t>‹#›</a:t>
             </a:fld>
             <a:endParaRPr lang="de-CH"/>
           </a:p>
@@ -3171,7 +3171,7 @@
           <a:p>
             <a:fld id="{E9D2D021-4DB1-4DE2-A389-81DEDCED8613}" type="slidenum">
               <a:rPr lang="de-CH" smtClean="0"/>
-              <a:t>‹Nr.›</a:t>
+              <a:t>‹#›</a:t>
             </a:fld>
             <a:endParaRPr lang="de-CH"/>
           </a:p>
@@ -4291,7 +4291,7 @@
           <a:p>
             <a:fld id="{E9D2D021-4DB1-4DE2-A389-81DEDCED8613}" type="slidenum">
               <a:rPr lang="de-CH" smtClean="0"/>
-              <a:t>‹Nr.›</a:t>
+              <a:t>‹#›</a:t>
             </a:fld>
             <a:endParaRPr lang="de-CH"/>
           </a:p>
@@ -4999,7 +4999,6 @@
               <a:rPr lang="de-CH" dirty="0" smtClean="0"/>
               <a:t>Terminplanung</a:t>
             </a:r>
-            <a:endParaRPr lang="de-CH" dirty="0" smtClean="0"/>
           </a:p>
           <a:p>
             <a:r>
@@ -5011,13 +5010,8 @@
             <a:pPr lvl="1"/>
             <a:r>
               <a:rPr lang="de-CH" dirty="0" smtClean="0"/>
-              <a:t>Terminplanung ist </a:t>
-            </a:r>
-            <a:r>
-              <a:rPr lang="de-CH" dirty="0" smtClean="0"/>
-              <a:t>implementiert</a:t>
-            </a:r>
-            <a:endParaRPr lang="de-CH" dirty="0" smtClean="0"/>
+              <a:t>Terminplanung ist implementiert</a:t>
+            </a:r>
           </a:p>
           <a:p>
             <a:r>
@@ -5031,7 +5025,6 @@
               <a:rPr lang="de-CH" dirty="0" smtClean="0"/>
               <a:t>Funktionalitäten der Terminplanung definieren und umsetzen</a:t>
             </a:r>
-            <a:endParaRPr lang="de-CH" dirty="0" smtClean="0"/>
           </a:p>
           <a:p>
             <a:r>
@@ -5046,7 +5039,6 @@
               <a:rPr lang="de-CH" dirty="0" smtClean="0"/>
               <a:t>Implementierte Terminplanung mit Funktionen wie Drop-In und mehrere Standorte</a:t>
             </a:r>
-            <a:endParaRPr lang="de-CH" dirty="0" smtClean="0"/>
           </a:p>
         </p:txBody>
       </p:sp>
@@ -5107,53 +5099,6 @@
       </p:grpSpPr>
       <p:sp>
         <p:nvSpPr>
-          <p:cNvPr id="2" name="Inhaltsplatzhalter 1"/>
-          <p:cNvSpPr>
-            <a:spLocks noGrp="1"/>
-          </p:cNvSpPr>
-          <p:nvPr>
-            <p:ph idx="1"/>
-          </p:nvPr>
-        </p:nvSpPr>
-        <p:spPr/>
-        <p:txBody>
-          <a:bodyPr/>
-          <a:lstStyle/>
-          <a:p>
-            <a:r>
-              <a:rPr lang="de-CH" dirty="0" smtClean="0"/>
-              <a:t>Aktivität</a:t>
-            </a:r>
-          </a:p>
-          <a:p>
-            <a:r>
-              <a:rPr lang="de-CH" dirty="0" smtClean="0"/>
-              <a:t>Ziel</a:t>
-            </a:r>
-          </a:p>
-          <a:p>
-            <a:r>
-              <a:rPr lang="de-CH" dirty="0" smtClean="0"/>
-              <a:t>Aufgaben</a:t>
-            </a:r>
-          </a:p>
-          <a:p>
-            <a:r>
-              <a:rPr lang="de-CH" dirty="0" smtClean="0"/>
-              <a:t>Ergebnisse</a:t>
-            </a:r>
-          </a:p>
-          <a:p>
-            <a:r>
-              <a:rPr lang="de-CH" dirty="0" smtClean="0"/>
-              <a:t>Amin</a:t>
-            </a:r>
-            <a:endParaRPr lang="de-CH" dirty="0"/>
-          </a:p>
-        </p:txBody>
-      </p:sp>
-      <p:sp>
-        <p:nvSpPr>
           <p:cNvPr id="3" name="Titel 2"/>
           <p:cNvSpPr>
             <a:spLocks noGrp="1"/>
@@ -5182,6 +5127,339 @@
               <a:t>Verordnungswesen</a:t>
             </a:r>
             <a:endParaRPr lang="de-CH" dirty="0"/>
+          </a:p>
+        </p:txBody>
+      </p:sp>
+      <p:sp>
+        <p:nvSpPr>
+          <p:cNvPr id="7" name="Inhaltsplatzhalter 1"/>
+          <p:cNvSpPr>
+            <a:spLocks noGrp="1"/>
+          </p:cNvSpPr>
+          <p:nvPr/>
+        </p:nvSpPr>
+        <p:spPr>
+          <a:xfrm>
+            <a:off x="457200" y="1409913"/>
+            <a:ext cx="8229600" cy="4971415"/>
+          </a:xfrm>
+          <a:prstGeom prst="rect">
+            <a:avLst/>
+          </a:prstGeom>
+        </p:spPr>
+        <p:txBody>
+          <a:bodyPr vert="horz">
+            <a:normAutofit/>
+          </a:bodyPr>
+          <a:lstStyle/>
+          <a:p>
+            <a:pPr marL="342900" lvl="0" indent="-342900" rtl="0">
+              <a:spcAft>
+                <a:spcPts val="0"/>
+              </a:spcAft>
+              <a:buFont typeface="Wingdings 3"/>
+              <a:buChar char=""/>
+              <a:tabLst>
+                <a:tab pos="457200" algn="l"/>
+              </a:tabLst>
+            </a:pPr>
+            <a:r>
+              <a:rPr lang="de-CH" sz="2700" kern="1200">
+                <a:solidFill>
+                  <a:srgbClr val="000000"/>
+                </a:solidFill>
+                <a:effectLst/>
+                <a:latin typeface="Calibri"/>
+                <a:ea typeface="Times New Roman"/>
+                <a:cs typeface="Arial"/>
+              </a:rPr>
+              <a:t>Aktivität</a:t>
+            </a:r>
+            <a:endParaRPr lang="de-DE" sz="1200">
+              <a:effectLst/>
+              <a:latin typeface="Times New Roman"/>
+              <a:ea typeface="Times New Roman"/>
+            </a:endParaRPr>
+          </a:p>
+          <a:p>
+            <a:pPr marL="742950" lvl="1" indent="-285750">
+              <a:spcAft>
+                <a:spcPts val="0"/>
+              </a:spcAft>
+              <a:buFont typeface="Verdana"/>
+              <a:buChar char="◦"/>
+              <a:tabLst>
+                <a:tab pos="914400" algn="l"/>
+              </a:tabLst>
+            </a:pPr>
+            <a:r>
+              <a:rPr lang="de-CH" sz="2300" kern="1200">
+                <a:solidFill>
+                  <a:srgbClr val="000000"/>
+                </a:solidFill>
+                <a:effectLst/>
+                <a:latin typeface="Calibri"/>
+                <a:ea typeface="Times New Roman"/>
+                <a:cs typeface="Arial"/>
+              </a:rPr>
+              <a:t>Medikamente und Behandlungen verordnen</a:t>
+            </a:r>
+            <a:endParaRPr lang="de-DE" sz="1200">
+              <a:effectLst/>
+              <a:latin typeface="Times New Roman"/>
+              <a:ea typeface="Times New Roman"/>
+            </a:endParaRPr>
+          </a:p>
+          <a:p>
+            <a:pPr marL="342900" lvl="0" indent="-342900">
+              <a:spcAft>
+                <a:spcPts val="0"/>
+              </a:spcAft>
+              <a:buFont typeface="Wingdings 3"/>
+              <a:buChar char=""/>
+              <a:tabLst>
+                <a:tab pos="457200" algn="l"/>
+              </a:tabLst>
+            </a:pPr>
+            <a:r>
+              <a:rPr lang="de-CH" sz="2700" kern="1200">
+                <a:solidFill>
+                  <a:srgbClr val="000000"/>
+                </a:solidFill>
+                <a:effectLst/>
+                <a:latin typeface="Calibri"/>
+                <a:ea typeface="Times New Roman"/>
+                <a:cs typeface="Arial"/>
+              </a:rPr>
+              <a:t>Ziel</a:t>
+            </a:r>
+            <a:endParaRPr lang="de-DE" sz="1200">
+              <a:effectLst/>
+              <a:latin typeface="Times New Roman"/>
+              <a:ea typeface="Times New Roman"/>
+            </a:endParaRPr>
+          </a:p>
+          <a:p>
+            <a:pPr marL="742950" lvl="1" indent="-285750">
+              <a:spcAft>
+                <a:spcPts val="0"/>
+              </a:spcAft>
+              <a:buFont typeface="Verdana"/>
+              <a:buChar char="◦"/>
+              <a:tabLst>
+                <a:tab pos="914400" algn="l"/>
+              </a:tabLst>
+            </a:pPr>
+            <a:r>
+              <a:rPr lang="de-CH" sz="2300" kern="1200">
+                <a:solidFill>
+                  <a:srgbClr val="000000"/>
+                </a:solidFill>
+                <a:effectLst/>
+                <a:latin typeface="Calibri"/>
+                <a:ea typeface="Times New Roman"/>
+                <a:cs typeface="Arial"/>
+              </a:rPr>
+              <a:t>Die Verordnung von Medikamente und Behandlungen in Software erfüllen.</a:t>
+            </a:r>
+            <a:endParaRPr lang="de-DE" sz="1200">
+              <a:effectLst/>
+              <a:latin typeface="Times New Roman"/>
+              <a:ea typeface="Times New Roman"/>
+            </a:endParaRPr>
+          </a:p>
+          <a:p>
+            <a:pPr marL="342900" lvl="0" indent="-342900">
+              <a:spcAft>
+                <a:spcPts val="0"/>
+              </a:spcAft>
+              <a:buFont typeface="Wingdings 3"/>
+              <a:buChar char=""/>
+              <a:tabLst>
+                <a:tab pos="457200" algn="l"/>
+              </a:tabLst>
+            </a:pPr>
+            <a:r>
+              <a:rPr lang="de-CH" sz="2700" kern="1200">
+                <a:solidFill>
+                  <a:srgbClr val="000000"/>
+                </a:solidFill>
+                <a:effectLst/>
+                <a:latin typeface="Calibri"/>
+                <a:ea typeface="Times New Roman"/>
+                <a:cs typeface="Arial"/>
+              </a:rPr>
+              <a:t>Aufgaben</a:t>
+            </a:r>
+            <a:endParaRPr lang="de-DE" sz="1200">
+              <a:effectLst/>
+              <a:latin typeface="Times New Roman"/>
+              <a:ea typeface="Times New Roman"/>
+            </a:endParaRPr>
+          </a:p>
+          <a:p>
+            <a:pPr marL="742950" lvl="1" indent="-285750">
+              <a:spcAft>
+                <a:spcPts val="0"/>
+              </a:spcAft>
+              <a:buFont typeface="Verdana"/>
+              <a:buChar char="◦"/>
+              <a:tabLst>
+                <a:tab pos="914400" algn="l"/>
+              </a:tabLst>
+            </a:pPr>
+            <a:r>
+              <a:rPr lang="de-CH" sz="2300" kern="1200">
+                <a:solidFill>
+                  <a:srgbClr val="000000"/>
+                </a:solidFill>
+                <a:effectLst/>
+                <a:latin typeface="Calibri"/>
+                <a:ea typeface="Times New Roman"/>
+                <a:cs typeface="Arial"/>
+              </a:rPr>
+              <a:t>Verschreibung von Medikamenten</a:t>
+            </a:r>
+            <a:r>
+              <a:rPr lang="en-US" sz="2300" kern="1200">
+                <a:solidFill>
+                  <a:srgbClr val="000000"/>
+                </a:solidFill>
+                <a:effectLst/>
+                <a:latin typeface="Calibri"/>
+                <a:ea typeface="Times New Roman"/>
+                <a:cs typeface="Arial"/>
+              </a:rPr>
+              <a:t>/Behandnulngen</a:t>
+            </a:r>
+            <a:r>
+              <a:rPr lang="de-CH" sz="2300" kern="1200">
+                <a:solidFill>
+                  <a:srgbClr val="000000"/>
+                </a:solidFill>
+                <a:effectLst/>
+                <a:latin typeface="Calibri"/>
+                <a:ea typeface="Times New Roman"/>
+                <a:cs typeface="Arial"/>
+              </a:rPr>
+              <a:t> implementieren.</a:t>
+            </a:r>
+            <a:endParaRPr lang="de-DE" sz="1200">
+              <a:effectLst/>
+              <a:latin typeface="Times New Roman"/>
+              <a:ea typeface="Times New Roman"/>
+            </a:endParaRPr>
+          </a:p>
+          <a:p>
+            <a:pPr marL="742950" lvl="1" indent="-285750">
+              <a:spcAft>
+                <a:spcPts val="0"/>
+              </a:spcAft>
+              <a:buFont typeface="Verdana"/>
+              <a:buChar char="◦"/>
+              <a:tabLst>
+                <a:tab pos="914400" algn="l"/>
+              </a:tabLst>
+            </a:pPr>
+            <a:r>
+              <a:rPr lang="de-CH" sz="2300" kern="1200">
+                <a:solidFill>
+                  <a:srgbClr val="000000"/>
+                </a:solidFill>
+                <a:effectLst/>
+                <a:latin typeface="Calibri"/>
+                <a:ea typeface="Times New Roman"/>
+                <a:cs typeface="Arial"/>
+              </a:rPr>
+              <a:t>Jeweilige Gebrauchsanweisung von Medikamente implementieren.</a:t>
+            </a:r>
+            <a:endParaRPr lang="de-DE" sz="1200">
+              <a:effectLst/>
+              <a:latin typeface="Times New Roman"/>
+              <a:ea typeface="Times New Roman"/>
+            </a:endParaRPr>
+          </a:p>
+          <a:p>
+            <a:pPr marL="342900" lvl="0" indent="-342900">
+              <a:spcAft>
+                <a:spcPts val="0"/>
+              </a:spcAft>
+              <a:buFont typeface="Wingdings 3"/>
+              <a:buChar char=""/>
+              <a:tabLst>
+                <a:tab pos="457200" algn="l"/>
+              </a:tabLst>
+            </a:pPr>
+            <a:r>
+              <a:rPr lang="de-CH" sz="2700" kern="1200">
+                <a:solidFill>
+                  <a:srgbClr val="000000"/>
+                </a:solidFill>
+                <a:effectLst/>
+                <a:latin typeface="Calibri"/>
+                <a:ea typeface="Times New Roman"/>
+                <a:cs typeface="Arial"/>
+              </a:rPr>
+              <a:t>Ergebnisse</a:t>
+            </a:r>
+            <a:endParaRPr lang="de-DE" sz="1200">
+              <a:effectLst/>
+              <a:latin typeface="Times New Roman"/>
+              <a:ea typeface="Times New Roman"/>
+            </a:endParaRPr>
+          </a:p>
+          <a:p>
+            <a:pPr marL="742950" lvl="1" indent="-285750">
+              <a:spcAft>
+                <a:spcPts val="0"/>
+              </a:spcAft>
+              <a:buFont typeface="Verdana"/>
+              <a:buChar char="◦"/>
+              <a:tabLst>
+                <a:tab pos="914400" algn="l"/>
+              </a:tabLst>
+            </a:pPr>
+            <a:r>
+              <a:rPr lang="de-CH" sz="2300" kern="1200">
+                <a:solidFill>
+                  <a:srgbClr val="000000"/>
+                </a:solidFill>
+                <a:effectLst/>
+                <a:latin typeface="Calibri"/>
+                <a:ea typeface="Times New Roman"/>
+                <a:cs typeface="Arial"/>
+              </a:rPr>
+              <a:t>Ein Rezept von Medikamente</a:t>
+            </a:r>
+            <a:r>
+              <a:rPr lang="en-US" sz="2300" kern="1200">
+                <a:solidFill>
+                  <a:srgbClr val="000000"/>
+                </a:solidFill>
+                <a:effectLst/>
+                <a:latin typeface="Calibri"/>
+                <a:ea typeface="Times New Roman"/>
+                <a:cs typeface="Arial"/>
+              </a:rPr>
+              <a:t>/Behandlungen f</a:t>
+            </a:r>
+            <a:r>
+              <a:rPr lang="de-CH" sz="2300" kern="1200">
+                <a:solidFill>
+                  <a:srgbClr val="000000"/>
+                </a:solidFill>
+                <a:effectLst/>
+                <a:latin typeface="Calibri"/>
+                <a:ea typeface="Times New Roman"/>
+                <a:cs typeface="Arial"/>
+              </a:rPr>
+              <a:t>ür jeweilige Patienten.</a:t>
+            </a:r>
+            <a:endParaRPr lang="de-DE" sz="1200">
+              <a:effectLst/>
+              <a:latin typeface="Times New Roman"/>
+              <a:ea typeface="Times New Roman"/>
+            </a:endParaRPr>
           </a:p>
         </p:txBody>
       </p:sp>

</xml_diff>